<commit_message>
finalized files, updated code and project report and presentation slides.
</commit_message>
<xml_diff>
--- a/timeseries-proj-presentation.pptx
+++ b/timeseries-proj-presentation.pptx
@@ -3958,7 +3958,7 @@
         </p:blipFill>
         <p:spPr>
           <a:xfrm>
-            <a:off x="5665785" y="1825625"/>
+            <a:off x="5665784" y="1457877"/>
             <a:ext cx="6158713" cy="1426345"/>
           </a:xfrm>
           <a:prstGeom prst="rect">
@@ -3980,7 +3980,7 @@
         </p:nvSpPr>
         <p:spPr>
           <a:xfrm>
-            <a:off x="2899487" y="5038035"/>
+            <a:off x="2899485" y="5269564"/>
             <a:ext cx="5532595" cy="523220"/>
           </a:xfrm>
           <a:prstGeom prst="rect">
@@ -4003,6 +4003,94 @@
               <a:rPr lang="en-US" sz="2800" dirty="0"/>
               <a:t>Best ARIMA Model = ARIMA(0, 1, 1)</a:t>
             </a:r>
+          </a:p>
+        </p:txBody>
+      </p:sp>
+      <p:pic>
+        <p:nvPicPr>
+          <p:cNvPr id="4" name="Picture 3">
+            <a:extLst>
+              <a:ext uri="{FF2B5EF4-FFF2-40B4-BE49-F238E27FC236}">
+                <a16:creationId xmlns:a16="http://schemas.microsoft.com/office/drawing/2014/main" id="{42E1E526-E73E-44BD-783F-8B001094A65A}"/>
+              </a:ext>
+            </a:extLst>
+          </p:cNvPr>
+          <p:cNvPicPr>
+            <a:picLocks noChangeAspect="1"/>
+          </p:cNvPicPr>
+          <p:nvPr/>
+        </p:nvPicPr>
+        <p:blipFill>
+          <a:blip r:embed="rId3" cstate="print">
+            <a:extLst>
+              <a:ext uri="{28A0092B-C50C-407E-A947-70E740481C1C}">
+                <a14:useLocalDpi xmlns:a14="http://schemas.microsoft.com/office/drawing/2010/main" val="0"/>
+              </a:ext>
+            </a:extLst>
+          </a:blip>
+          <a:stretch>
+            <a:fillRect/>
+          </a:stretch>
+        </p:blipFill>
+        <p:spPr>
+          <a:xfrm>
+            <a:off x="5665783" y="2869510"/>
+            <a:ext cx="6268331" cy="2229263"/>
+          </a:xfrm>
+          <a:prstGeom prst="rect">
+            <a:avLst/>
+          </a:prstGeom>
+        </p:spPr>
+      </p:pic>
+      <p:sp>
+        <p:nvSpPr>
+          <p:cNvPr id="8" name="Rounded Rectangle 7">
+            <a:extLst>
+              <a:ext uri="{FF2B5EF4-FFF2-40B4-BE49-F238E27FC236}">
+                <a16:creationId xmlns:a16="http://schemas.microsoft.com/office/drawing/2014/main" id="{E8564004-2817-4119-D87C-8637F5C31AE6}"/>
+              </a:ext>
+            </a:extLst>
+          </p:cNvPr>
+          <p:cNvSpPr/>
+          <p:nvPr/>
+        </p:nvSpPr>
+        <p:spPr>
+          <a:xfrm>
+            <a:off x="5665783" y="4094922"/>
+            <a:ext cx="1251852" cy="606287"/>
+          </a:xfrm>
+          <a:prstGeom prst="roundRect">
+            <a:avLst/>
+          </a:prstGeom>
+          <a:noFill/>
+          <a:ln w="38100">
+            <a:solidFill>
+              <a:srgbClr val="FF0000"/>
+            </a:solidFill>
+          </a:ln>
+        </p:spPr>
+        <p:style>
+          <a:lnRef idx="2">
+            <a:schemeClr val="accent1">
+              <a:shade val="50000"/>
+            </a:schemeClr>
+          </a:lnRef>
+          <a:fillRef idx="1">
+            <a:schemeClr val="accent1"/>
+          </a:fillRef>
+          <a:effectRef idx="0">
+            <a:schemeClr val="accent1"/>
+          </a:effectRef>
+          <a:fontRef idx="minor">
+            <a:schemeClr val="lt1"/>
+          </a:fontRef>
+        </p:style>
+        <p:txBody>
+          <a:bodyPr rtlCol="0" anchor="ctr"/>
+          <a:lstStyle/>
+          <a:p>
+            <a:pPr algn="ctr"/>
+            <a:endParaRPr lang="en-US"/>
           </a:p>
         </p:txBody>
       </p:sp>
@@ -4271,7 +4359,7 @@
             </a:pPr>
             <a:r>
               <a:rPr lang="en-US" dirty="0"/>
-              <a:t>Residual Plot – Mean is fairly constant, variance is constant, except for spike at time = 29, only outlier, so we ignore it.</a:t>
+              <a:t>Residual Plot – Mean is fairly constant, variance is constant, except for spike at time = 28, only outlier, so we ignore it.</a:t>
             </a:r>
           </a:p>
           <a:p>
@@ -5370,8 +5458,38 @@
         </p:blipFill>
         <p:spPr>
           <a:xfrm>
-            <a:off x="3134388" y="1690688"/>
-            <a:ext cx="6154062" cy="4346575"/>
+            <a:off x="838200" y="1690688"/>
+            <a:ext cx="4538870" cy="3205775"/>
+          </a:xfrm>
+          <a:prstGeom prst="rect">
+            <a:avLst/>
+          </a:prstGeom>
+        </p:spPr>
+      </p:pic>
+      <p:pic>
+        <p:nvPicPr>
+          <p:cNvPr id="4" name="Picture 3">
+            <a:extLst>
+              <a:ext uri="{FF2B5EF4-FFF2-40B4-BE49-F238E27FC236}">
+                <a16:creationId xmlns:a16="http://schemas.microsoft.com/office/drawing/2014/main" id="{75DAFD7B-3DEA-8E1F-C91B-00C7166E8941}"/>
+              </a:ext>
+            </a:extLst>
+          </p:cNvPr>
+          <p:cNvPicPr>
+            <a:picLocks noChangeAspect="1"/>
+          </p:cNvPicPr>
+          <p:nvPr/>
+        </p:nvPicPr>
+        <p:blipFill>
+          <a:blip r:embed="rId3"/>
+          <a:stretch>
+            <a:fillRect/>
+          </a:stretch>
+        </p:blipFill>
+        <p:spPr>
+          <a:xfrm>
+            <a:off x="6744804" y="1690687"/>
+            <a:ext cx="4417214" cy="3119851"/>
           </a:xfrm>
           <a:prstGeom prst="rect">
             <a:avLst/>
@@ -5458,7 +5576,7 @@
         <p:spPr>
           <a:xfrm>
             <a:off x="838200" y="1825625"/>
-            <a:ext cx="5257800" cy="4351338"/>
+            <a:ext cx="8991600" cy="4351338"/>
           </a:xfrm>
         </p:spPr>
         <p:txBody>

</xml_diff>